<commit_message>
3 port to 2 port S parameter simulation done
</commit_message>
<xml_diff>
--- a/Document/PPT/LabMeeting/20231225/20231215_RFSoC_Meeting.pptx
+++ b/Document/PPT/LabMeeting/20231225/20231215_RFSoC_Meeting.pptx
@@ -220,7 +220,7 @@
           <a:p>
             <a:fld id="{8ECD4658-FC5F-4C4A-9C84-93B50C1C7551}" type="datetimeFigureOut">
               <a:rPr kumimoji="1" lang="ko-Kore-KR" altLang="en-US" smtClean="0"/>
-              <a:t>12/15/2023</a:t>
+              <a:t>12/16/2023</a:t>
             </a:fld>
             <a:endParaRPr kumimoji="1" lang="ko-Kore-KR" altLang="en-US"/>
           </a:p>
@@ -14386,7 +14386,7 @@
         </p:nvCxnSpPr>
         <p:spPr>
           <a:xfrm flipH="1">
-            <a:off x="5820896" y="4100444"/>
+            <a:off x="3554894" y="4066607"/>
             <a:ext cx="358863" cy="0"/>
           </a:xfrm>
           <a:prstGeom prst="line">
@@ -14420,14 +14420,12 @@
           </p:cNvPr>
           <p:cNvCxnSpPr>
             <a:cxnSpLocks/>
-            <a:stCxn id="18" idx="1"/>
-            <a:endCxn id="11" idx="3"/>
           </p:cNvCxnSpPr>
           <p:nvPr/>
         </p:nvCxnSpPr>
         <p:spPr>
           <a:xfrm flipH="1">
-            <a:off x="4534850" y="3932320"/>
+            <a:off x="4549071" y="3821908"/>
             <a:ext cx="658569" cy="654"/>
           </a:xfrm>
           <a:prstGeom prst="line">
@@ -14610,7 +14608,7 @@
         </p:nvSpPr>
         <p:spPr>
           <a:xfrm>
-            <a:off x="6123404" y="4512785"/>
+            <a:off x="3526320" y="4464203"/>
             <a:ext cx="85725" cy="412314"/>
           </a:xfrm>
           <a:custGeom>
@@ -14752,7 +14750,7 @@
         </p:nvGrpSpPr>
         <p:grpSpPr>
           <a:xfrm>
-            <a:off x="6008712" y="4929301"/>
+            <a:off x="3411628" y="4880719"/>
             <a:ext cx="286087" cy="83589"/>
             <a:chOff x="2911786" y="5051364"/>
             <a:chExt cx="286087" cy="83589"/>
@@ -15108,7 +15106,7 @@
         </p:nvCxnSpPr>
         <p:spPr>
           <a:xfrm>
-            <a:off x="6166267" y="4098856"/>
+            <a:off x="3569183" y="4050274"/>
             <a:ext cx="0" cy="433730"/>
           </a:xfrm>
           <a:prstGeom prst="line">
@@ -15309,6 +15307,49 @@
           </a:p>
         </p:txBody>
       </p:sp>
+      <p:cxnSp>
+        <p:nvCxnSpPr>
+          <p:cNvPr id="3" name="직선 연결선[R] 89">
+            <a:extLst>
+              <a:ext uri="{FF2B5EF4-FFF2-40B4-BE49-F238E27FC236}">
+                <a16:creationId xmlns:a16="http://schemas.microsoft.com/office/drawing/2014/main" id="{FAD58166-F183-1168-B8B2-FC369FA004C2}"/>
+              </a:ext>
+            </a:extLst>
+          </p:cNvPr>
+          <p:cNvCxnSpPr>
+            <a:cxnSpLocks/>
+          </p:cNvCxnSpPr>
+          <p:nvPr/>
+        </p:nvCxnSpPr>
+        <p:spPr>
+          <a:xfrm flipH="1">
+            <a:off x="4549071" y="4064712"/>
+            <a:ext cx="658569" cy="654"/>
+          </a:xfrm>
+          <a:prstGeom prst="line">
+            <a:avLst/>
+          </a:prstGeom>
+          <a:ln w="25400">
+            <a:solidFill>
+              <a:schemeClr val="tx1"/>
+            </a:solidFill>
+          </a:ln>
+        </p:spPr>
+        <p:style>
+          <a:lnRef idx="1">
+            <a:schemeClr val="dk1"/>
+          </a:lnRef>
+          <a:fillRef idx="0">
+            <a:schemeClr val="dk1"/>
+          </a:fillRef>
+          <a:effectRef idx="0">
+            <a:schemeClr val="dk1"/>
+          </a:effectRef>
+          <a:fontRef idx="minor">
+            <a:schemeClr val="tx1"/>
+          </a:fontRef>
+        </p:style>
+      </p:cxnSp>
     </p:spTree>
     <p:extLst>
       <p:ext uri="{BB962C8B-B14F-4D97-AF65-F5344CB8AC3E}">

</xml_diff>